<commit_message>
Doc: Merge release back into develop
</commit_message>
<xml_diff>
--- a/GIT_ARL_ParaPower_Workflow.pptx
+++ b/GIT_ARL_ParaPower_Workflow.pptx
@@ -9086,8 +9086,8 @@
         </p:nvSpPr>
         <p:spPr bwMode="auto">
           <a:xfrm>
-            <a:off x="1371600" y="6638559"/>
-            <a:ext cx="6400800" cy="215444"/>
+            <a:off x="-9086" y="6638559"/>
+            <a:ext cx="7781486" cy="215444"/>
           </a:xfrm>
           <a:prstGeom prst="rect">
             <a:avLst/>
@@ -9106,7 +9106,7 @@
           </a:bodyPr>
           <a:lstStyle/>
           <a:p>
-            <a:pPr algn="ctr">
+            <a:pPr algn="l">
               <a:defRPr/>
             </a:pPr>
             <a:r>
@@ -11593,14 +11593,14 @@
           <p:nvPr>
             <p:extLst>
               <p:ext uri="{D42A27DB-BD31-4B8C-83A1-F6EECF244321}">
-                <p14:modId xmlns:p14="http://schemas.microsoft.com/office/powerpoint/2010/main" val="1754795260"/>
+                <p14:modId xmlns:p14="http://schemas.microsoft.com/office/powerpoint/2010/main" val="427482963"/>
               </p:ext>
             </p:extLst>
           </p:nvPr>
         </p:nvGraphicFramePr>
         <p:xfrm>
-          <a:off x="516034" y="509010"/>
-          <a:ext cx="8379390" cy="3291840"/>
+          <a:off x="463153" y="800598"/>
+          <a:ext cx="8379390" cy="2852928"/>
         </p:xfrm>
         <a:graphic>
           <a:graphicData uri="http://schemas.openxmlformats.org/drawingml/2006/table">
@@ -11665,7 +11665,7 @@
                       <a:endParaRPr lang="en-US" sz="1200" dirty="0"/>
                     </a:p>
                   </a:txBody>
-                  <a:tcPr/>
+                  <a:tcPr marT="18288" marB="18288"/>
                 </a:tc>
                 <a:tc>
                   <a:txBody>
@@ -11679,7 +11679,7 @@
                       <a:endParaRPr lang="en-US" sz="1200" dirty="0"/>
                     </a:p>
                   </a:txBody>
-                  <a:tcPr/>
+                  <a:tcPr marT="18288" marB="18288"/>
                 </a:tc>
                 <a:tc>
                   <a:txBody>
@@ -11693,7 +11693,7 @@
                       <a:endParaRPr lang="en-US" sz="1200" dirty="0"/>
                     </a:p>
                   </a:txBody>
-                  <a:tcPr/>
+                  <a:tcPr marT="18288" marB="18288"/>
                 </a:tc>
                 <a:tc>
                   <a:txBody>
@@ -11707,7 +11707,7 @@
                       <a:endParaRPr lang="en-US" sz="1200" dirty="0"/>
                     </a:p>
                   </a:txBody>
-                  <a:tcPr/>
+                  <a:tcPr marT="18288" marB="18288"/>
                 </a:tc>
                 <a:tc>
                   <a:txBody>
@@ -11721,7 +11721,7 @@
                       <a:endParaRPr lang="en-US" sz="1200" dirty="0"/>
                     </a:p>
                   </a:txBody>
-                  <a:tcPr/>
+                  <a:tcPr marT="18288" marB="18288"/>
                 </a:tc>
                 <a:tc>
                   <a:txBody>
@@ -11735,7 +11735,7 @@
                       <a:endParaRPr lang="en-US" sz="1200" dirty="0"/>
                     </a:p>
                   </a:txBody>
-                  <a:tcPr/>
+                  <a:tcPr marT="18288" marB="18288"/>
                 </a:tc>
                 <a:extLst>
                   <a:ext uri="{0D108BD9-81ED-4DB2-BD59-A6C34878D82A}">
@@ -11756,7 +11756,7 @@
                       <a:endParaRPr lang="en-US" sz="1200" dirty="0"/>
                     </a:p>
                   </a:txBody>
-                  <a:tcPr anchor="ctr">
+                  <a:tcPr marT="18288" marB="18288" anchor="ctr">
                     <a:solidFill>
                       <a:schemeClr val="tx2">
                         <a:lumMod val="40000"/>
@@ -11781,7 +11781,7 @@
                       <a:endParaRPr lang="en-US" sz="1200" dirty="0"/>
                     </a:p>
                   </a:txBody>
-                  <a:tcPr anchor="ctr">
+                  <a:tcPr marT="18288" marB="18288" anchor="ctr">
                     <a:solidFill>
                       <a:schemeClr val="tx2">
                         <a:lumMod val="40000"/>
@@ -11802,7 +11802,7 @@
                       <a:endParaRPr lang="en-US" sz="1200" dirty="0"/>
                     </a:p>
                   </a:txBody>
-                  <a:tcPr anchor="ctr">
+                  <a:tcPr marT="18288" marB="18288" anchor="ctr">
                     <a:solidFill>
                       <a:schemeClr val="tx2">
                         <a:lumMod val="40000"/>
@@ -11823,7 +11823,7 @@
                       <a:endParaRPr lang="en-US" sz="1200" dirty="0"/>
                     </a:p>
                   </a:txBody>
-                  <a:tcPr anchor="ctr">
+                  <a:tcPr marT="18288" marB="18288" anchor="ctr">
                     <a:solidFill>
                       <a:schemeClr val="tx2">
                         <a:lumMod val="40000"/>
@@ -11844,7 +11844,7 @@
                       <a:endParaRPr lang="en-US" sz="1200" dirty="0"/>
                     </a:p>
                   </a:txBody>
-                  <a:tcPr anchor="ctr">
+                  <a:tcPr marT="18288" marB="18288" anchor="ctr">
                     <a:solidFill>
                       <a:schemeClr val="tx2">
                         <a:lumMod val="40000"/>
@@ -11865,7 +11865,7 @@
                       <a:endParaRPr lang="en-US" sz="1200" dirty="0"/>
                     </a:p>
                   </a:txBody>
-                  <a:tcPr anchor="ctr">
+                  <a:tcPr marT="18288" marB="18288" anchor="ctr">
                     <a:solidFill>
                       <a:schemeClr val="tx2">
                         <a:lumMod val="40000"/>
@@ -11893,7 +11893,7 @@
                       <a:endParaRPr lang="en-US" sz="1200" dirty="0"/>
                     </a:p>
                   </a:txBody>
-                  <a:tcPr anchor="ctr">
+                  <a:tcPr marT="18288" marB="18288" anchor="ctr">
                     <a:solidFill>
                       <a:srgbClr val="92D050"/>
                     </a:solidFill>
@@ -11910,16 +11910,12 @@
                       </a:r>
                       <a:r>
                         <a:rPr lang="en-US" sz="1200" baseline="0" dirty="0" smtClean="0"/>
-                        <a:t> awaiting </a:t>
-                      </a:r>
-                      <a:r>
-                        <a:rPr lang="en-US" sz="1200" baseline="0" dirty="0" smtClean="0"/>
-                        <a:t>release </a:t>
+                        <a:t> awaiting release </a:t>
                       </a:r>
                       <a:endParaRPr lang="en-US" sz="1200" dirty="0"/>
                     </a:p>
                   </a:txBody>
-                  <a:tcPr anchor="ctr">
+                  <a:tcPr marT="18288" marB="18288" anchor="ctr">
                     <a:solidFill>
                       <a:srgbClr val="92D050"/>
                     </a:solidFill>
@@ -11937,7 +11933,7 @@
                       <a:endParaRPr lang="en-US" sz="1200" dirty="0"/>
                     </a:p>
                   </a:txBody>
-                  <a:tcPr anchor="ctr">
+                  <a:tcPr marT="18288" marB="18288" anchor="ctr">
                     <a:solidFill>
                       <a:srgbClr val="92D050"/>
                     </a:solidFill>
@@ -11961,7 +11957,7 @@
                       <a:endParaRPr lang="en-US" sz="1200" dirty="0"/>
                     </a:p>
                   </a:txBody>
-                  <a:tcPr anchor="ctr">
+                  <a:tcPr marT="18288" marB="18288" anchor="ctr">
                     <a:solidFill>
                       <a:srgbClr val="92D050"/>
                     </a:solidFill>
@@ -11979,7 +11975,7 @@
                       <a:endParaRPr lang="en-US" sz="1200" dirty="0"/>
                     </a:p>
                   </a:txBody>
-                  <a:tcPr anchor="ctr">
+                  <a:tcPr marT="18288" marB="18288" anchor="ctr">
                     <a:solidFill>
                       <a:srgbClr val="92D050"/>
                     </a:solidFill>
@@ -11997,7 +11993,7 @@
                       <a:endParaRPr lang="en-US" sz="1200" dirty="0"/>
                     </a:p>
                   </a:txBody>
-                  <a:tcPr anchor="ctr">
+                  <a:tcPr marT="18288" marB="18288" anchor="ctr">
                     <a:solidFill>
                       <a:srgbClr val="92D050"/>
                     </a:solidFill>
@@ -12022,7 +12018,7 @@
                       <a:endParaRPr lang="en-US" sz="1200" dirty="0"/>
                     </a:p>
                   </a:txBody>
-                  <a:tcPr anchor="ctr">
+                  <a:tcPr marT="18288" marB="18288" anchor="ctr">
                     <a:solidFill>
                       <a:srgbClr val="FF9999"/>
                     </a:solidFill>
@@ -12044,7 +12040,7 @@
                       <a:endParaRPr lang="en-US" sz="1200" dirty="0"/>
                     </a:p>
                   </a:txBody>
-                  <a:tcPr anchor="ctr">
+                  <a:tcPr marT="18288" marB="18288" anchor="ctr">
                     <a:solidFill>
                       <a:srgbClr val="FF9999"/>
                     </a:solidFill>
@@ -12062,7 +12058,7 @@
                       <a:endParaRPr lang="en-US" sz="1200" dirty="0"/>
                     </a:p>
                   </a:txBody>
-                  <a:tcPr anchor="ctr">
+                  <a:tcPr marT="18288" marB="18288" anchor="ctr">
                     <a:solidFill>
                       <a:srgbClr val="FF9999"/>
                     </a:solidFill>
@@ -12080,7 +12076,7 @@
                       <a:endParaRPr lang="en-US" sz="1200" dirty="0"/>
                     </a:p>
                   </a:txBody>
-                  <a:tcPr anchor="ctr">
+                  <a:tcPr marT="18288" marB="18288" anchor="ctr">
                     <a:solidFill>
                       <a:srgbClr val="FF9999"/>
                     </a:solidFill>
@@ -12104,7 +12100,7 @@
                       <a:endParaRPr lang="en-US" sz="1200" dirty="0"/>
                     </a:p>
                   </a:txBody>
-                  <a:tcPr anchor="ctr">
+                  <a:tcPr marT="18288" marB="18288" anchor="ctr">
                     <a:solidFill>
                       <a:srgbClr val="FF9999"/>
                     </a:solidFill>
@@ -12122,7 +12118,7 @@
                       <a:endParaRPr lang="en-US" sz="1200" dirty="0"/>
                     </a:p>
                   </a:txBody>
-                  <a:tcPr anchor="ctr">
+                  <a:tcPr marT="18288" marB="18288" anchor="ctr">
                     <a:solidFill>
                       <a:srgbClr val="FF9999"/>
                     </a:solidFill>
@@ -12147,7 +12143,7 @@
                       <a:endParaRPr lang="en-US" sz="1200" dirty="0"/>
                     </a:p>
                   </a:txBody>
-                  <a:tcPr anchor="ctr">
+                  <a:tcPr marT="18288" marB="18288" anchor="ctr">
                     <a:solidFill>
                       <a:srgbClr val="9999FF"/>
                     </a:solidFill>
@@ -12169,7 +12165,7 @@
                       <a:endParaRPr lang="en-US" sz="1200" dirty="0"/>
                     </a:p>
                   </a:txBody>
-                  <a:tcPr anchor="ctr">
+                  <a:tcPr marT="18288" marB="18288" anchor="ctr">
                     <a:solidFill>
                       <a:srgbClr val="9999FF"/>
                     </a:solidFill>
@@ -12187,7 +12183,7 @@
                       <a:endParaRPr lang="en-US" sz="1200" dirty="0"/>
                     </a:p>
                   </a:txBody>
-                  <a:tcPr anchor="ctr">
+                  <a:tcPr marT="18288" marB="18288" anchor="ctr">
                     <a:solidFill>
                       <a:srgbClr val="9999FF"/>
                     </a:solidFill>
@@ -12212,7 +12208,7 @@
                       <a:endParaRPr lang="en-US" sz="1200" dirty="0"/>
                     </a:p>
                   </a:txBody>
-                  <a:tcPr anchor="ctr">
+                  <a:tcPr marT="18288" marB="18288" anchor="ctr">
                     <a:solidFill>
                       <a:srgbClr val="9999FF"/>
                     </a:solidFill>
@@ -12230,7 +12226,7 @@
                       <a:endParaRPr lang="en-US" sz="1200" dirty="0"/>
                     </a:p>
                   </a:txBody>
-                  <a:tcPr anchor="ctr">
+                  <a:tcPr marT="18288" marB="18288" anchor="ctr">
                     <a:solidFill>
                       <a:srgbClr val="9999FF"/>
                     </a:solidFill>
@@ -12244,7 +12240,7 @@
                       <a:endParaRPr lang="en-US" sz="1200" dirty="0"/>
                     </a:p>
                   </a:txBody>
-                  <a:tcPr anchor="ctr">
+                  <a:tcPr marT="18288" marB="18288" anchor="ctr">
                     <a:solidFill>
                       <a:srgbClr val="9999FF"/>
                     </a:solidFill>
@@ -12269,7 +12265,7 @@
                       <a:endParaRPr lang="en-US" sz="1200" dirty="0"/>
                     </a:p>
                   </a:txBody>
-                  <a:tcPr anchor="ctr">
+                  <a:tcPr marT="18288" marB="18288" anchor="ctr">
                     <a:solidFill>
                       <a:srgbClr val="66FFFF"/>
                     </a:solidFill>
@@ -12291,7 +12287,7 @@
                       <a:endParaRPr lang="en-US" sz="1200" dirty="0"/>
                     </a:p>
                   </a:txBody>
-                  <a:tcPr anchor="ctr">
+                  <a:tcPr marT="18288" marB="18288" anchor="ctr">
                     <a:solidFill>
                       <a:srgbClr val="66FFFF"/>
                     </a:solidFill>
@@ -12309,7 +12305,7 @@
                       <a:endParaRPr lang="en-US" sz="1200" dirty="0"/>
                     </a:p>
                   </a:txBody>
-                  <a:tcPr anchor="ctr">
+                  <a:tcPr marT="18288" marB="18288" anchor="ctr">
                     <a:solidFill>
                       <a:srgbClr val="66FFFF"/>
                     </a:solidFill>
@@ -12334,7 +12330,7 @@
                       <a:endParaRPr lang="en-US" sz="1200" dirty="0"/>
                     </a:p>
                   </a:txBody>
-                  <a:tcPr anchor="ctr">
+                  <a:tcPr marT="18288" marB="18288" anchor="ctr">
                     <a:solidFill>
                       <a:srgbClr val="66FFFF"/>
                     </a:solidFill>
@@ -12352,7 +12348,7 @@
                       <a:endParaRPr lang="en-US" sz="1200" dirty="0"/>
                     </a:p>
                   </a:txBody>
-                  <a:tcPr anchor="ctr">
+                  <a:tcPr marT="18288" marB="18288" anchor="ctr">
                     <a:solidFill>
                       <a:srgbClr val="66FFFF"/>
                     </a:solidFill>
@@ -12366,7 +12362,7 @@
                       <a:endParaRPr lang="en-US" sz="1200" dirty="0"/>
                     </a:p>
                   </a:txBody>
-                  <a:tcPr anchor="ctr">
+                  <a:tcPr marT="18288" marB="18288" anchor="ctr">
                     <a:solidFill>
                       <a:srgbClr val="66FFFF"/>
                     </a:solidFill>
@@ -12391,7 +12387,7 @@
                       <a:endParaRPr lang="en-US" sz="1200" dirty="0"/>
                     </a:p>
                   </a:txBody>
-                  <a:tcPr anchor="ctr">
+                  <a:tcPr marT="18288" marB="18288" anchor="ctr">
                     <a:solidFill>
                       <a:srgbClr val="FF99FF"/>
                     </a:solidFill>
@@ -12413,7 +12409,7 @@
                       <a:endParaRPr lang="en-US" sz="1200" dirty="0"/>
                     </a:p>
                   </a:txBody>
-                  <a:tcPr anchor="ctr">
+                  <a:tcPr marT="18288" marB="18288" anchor="ctr">
                     <a:solidFill>
                       <a:srgbClr val="FF99FF"/>
                     </a:solidFill>
@@ -12430,7 +12426,7 @@
                       </a:r>
                     </a:p>
                   </a:txBody>
-                  <a:tcPr anchor="ctr">
+                  <a:tcPr marT="18288" marB="18288" anchor="ctr">
                     <a:solidFill>
                       <a:srgbClr val="FF99FF"/>
                     </a:solidFill>
@@ -12454,7 +12450,7 @@
                       <a:endParaRPr lang="en-US" sz="1200" dirty="0"/>
                     </a:p>
                   </a:txBody>
-                  <a:tcPr anchor="ctr">
+                  <a:tcPr marT="18288" marB="18288" anchor="ctr">
                     <a:solidFill>
                       <a:srgbClr val="FF99FF"/>
                     </a:solidFill>
@@ -12472,7 +12468,7 @@
                       <a:endParaRPr lang="en-US" sz="1200" dirty="0"/>
                     </a:p>
                   </a:txBody>
-                  <a:tcPr anchor="ctr">
+                  <a:tcPr marT="18288" marB="18288" anchor="ctr">
                     <a:solidFill>
                       <a:srgbClr val="FF99FF"/>
                     </a:solidFill>
@@ -12486,7 +12482,7 @@
                       <a:endParaRPr lang="en-US" sz="1200" dirty="0"/>
                     </a:p>
                   </a:txBody>
-                  <a:tcPr anchor="ctr">
+                  <a:tcPr marT="18288" marB="18288" anchor="ctr">
                     <a:solidFill>
                       <a:srgbClr val="FF99FF"/>
                     </a:solidFill>
@@ -12515,7 +12511,7 @@
                       <a:endParaRPr lang="en-US" sz="1200" dirty="0"/>
                     </a:p>
                   </a:txBody>
-                  <a:tcPr anchor="ctr">
+                  <a:tcPr marT="18288" marB="18288" anchor="ctr">
                     <a:solidFill>
                       <a:srgbClr val="FFCCFF"/>
                     </a:solidFill>
@@ -12537,7 +12533,7 @@
                       <a:endParaRPr lang="en-US" sz="1200" dirty="0"/>
                     </a:p>
                   </a:txBody>
-                  <a:tcPr anchor="ctr">
+                  <a:tcPr marT="18288" marB="18288" anchor="ctr">
                     <a:solidFill>
                       <a:srgbClr val="FFCCFF"/>
                     </a:solidFill>
@@ -12555,7 +12551,7 @@
                       <a:endParaRPr lang="en-US" sz="1200" dirty="0"/>
                     </a:p>
                   </a:txBody>
-                  <a:tcPr anchor="ctr">
+                  <a:tcPr marT="18288" marB="18288" anchor="ctr">
                     <a:solidFill>
                       <a:srgbClr val="FFCCFF"/>
                     </a:solidFill>
@@ -12580,7 +12576,7 @@
                       <a:endParaRPr lang="en-US" sz="1200" dirty="0"/>
                     </a:p>
                   </a:txBody>
-                  <a:tcPr anchor="ctr">
+                  <a:tcPr marT="18288" marB="18288" anchor="ctr">
                     <a:solidFill>
                       <a:srgbClr val="FFCCFF"/>
                     </a:solidFill>
@@ -12598,7 +12594,7 @@
                       <a:endParaRPr lang="en-US" sz="1200" dirty="0"/>
                     </a:p>
                   </a:txBody>
-                  <a:tcPr anchor="ctr">
+                  <a:tcPr marT="18288" marB="18288" anchor="ctr">
                     <a:solidFill>
                       <a:srgbClr val="FFCCFF"/>
                     </a:solidFill>
@@ -12612,7 +12608,7 @@
                       <a:endParaRPr lang="en-US" sz="1200" dirty="0"/>
                     </a:p>
                   </a:txBody>
-                  <a:tcPr anchor="ctr">
+                  <a:tcPr marT="18288" marB="18288" anchor="ctr">
                     <a:solidFill>
                       <a:srgbClr val="FFCCFF"/>
                     </a:solidFill>
@@ -12636,8 +12632,8 @@
         </p:nvSpPr>
         <p:spPr>
           <a:xfrm>
-            <a:off x="5266375" y="3781526"/>
-            <a:ext cx="4163756" cy="3308598"/>
+            <a:off x="5266375" y="3631517"/>
+            <a:ext cx="4163756" cy="3647152"/>
           </a:xfrm>
           <a:prstGeom prst="rect">
             <a:avLst/>
@@ -12662,11 +12658,7 @@
             </a:pPr>
             <a:r>
               <a:rPr lang="en-US" sz="1100" dirty="0" smtClean="0"/>
-              <a:t>Create branch </a:t>
-            </a:r>
-            <a:r>
-              <a:rPr lang="en-US" sz="1100" dirty="0" smtClean="0"/>
-              <a:t>off of Develop, Name is </a:t>
+              <a:t>Create branch off of Develop, Name is </a:t>
             </a:r>
             <a:r>
               <a:rPr lang="en-US" sz="1100" dirty="0" err="1" smtClean="0"/>
@@ -12716,11 +12708,7 @@
             </a:r>
             <a:r>
               <a:rPr lang="en-US" sz="1100" dirty="0" smtClean="0"/>
-              <a:t> b</a:t>
-            </a:r>
-            <a:r>
-              <a:rPr lang="en-US" sz="1100" dirty="0" smtClean="0"/>
-              <a:t>ranch </a:t>
+              <a:t> branch </a:t>
             </a:r>
             <a:r>
               <a:rPr lang="en-US" sz="1100" dirty="0"/>
@@ -12786,15 +12774,7 @@
             </a:pPr>
             <a:r>
               <a:rPr lang="en-US" sz="1100" dirty="0" smtClean="0"/>
-              <a:t>Create b</a:t>
-            </a:r>
-            <a:r>
-              <a:rPr lang="en-US" sz="1100" dirty="0" smtClean="0"/>
-              <a:t>ranch </a:t>
-            </a:r>
-            <a:r>
-              <a:rPr lang="en-US" sz="1100" dirty="0" smtClean="0"/>
-              <a:t>off Develop, Name is R-</a:t>
+              <a:t>Create branch off Develop, Name is R-</a:t>
             </a:r>
             <a:r>
               <a:rPr lang="en-US" sz="1100" dirty="0" err="1" smtClean="0"/>
@@ -12819,14 +12799,13 @@
             </a:pPr>
             <a:r>
               <a:rPr lang="en-US" sz="1100" dirty="0" smtClean="0"/>
-              <a:t>Merge into Master</a:t>
-            </a:r>
-          </a:p>
-          <a:p>
-            <a:r>
-              <a:rPr lang="en-US" sz="1100" b="1" dirty="0" smtClean="0"/>
-              <a:t>Fix Critical Bug in Release</a:t>
-            </a:r>
+              <a:t>Update </a:t>
+            </a:r>
+            <a:r>
+              <a:rPr lang="en-US" sz="1100" dirty="0" smtClean="0"/>
+              <a:t>Version.txt (If any other files updated must merge back into Develop also)</a:t>
+            </a:r>
+            <a:endParaRPr lang="en-US" sz="1100" dirty="0" smtClean="0"/>
           </a:p>
           <a:p>
             <a:pPr marL="171450" indent="-171450">
@@ -12835,15 +12814,28 @@
             </a:pPr>
             <a:r>
               <a:rPr lang="en-US" sz="1100" dirty="0" smtClean="0"/>
-              <a:t>Create b</a:t>
+              <a:t>Merge into Master AND </a:t>
             </a:r>
             <a:r>
               <a:rPr lang="en-US" sz="1100" dirty="0" smtClean="0"/>
-              <a:t>ranch </a:t>
-            </a:r>
+              <a:t>Develop</a:t>
+            </a:r>
+            <a:endParaRPr lang="en-US" sz="1100" dirty="0" smtClean="0"/>
+          </a:p>
+          <a:p>
+            <a:r>
+              <a:rPr lang="en-US" sz="1100" b="1" dirty="0" smtClean="0"/>
+              <a:t>Fix Critical Bug in Release</a:t>
+            </a:r>
+          </a:p>
+          <a:p>
+            <a:pPr marL="171450" indent="-171450">
+              <a:buFont typeface="Arial" panose="020B0604020202020204" pitchFamily="34" charset="0"/>
+              <a:buChar char="•"/>
+            </a:pPr>
             <a:r>
               <a:rPr lang="en-US" sz="1100" dirty="0" smtClean="0"/>
-              <a:t>off of Master, Name is Hotfix-NNN</a:t>
+              <a:t>Create branch off of Master, Name is Hotfix-NNN</a:t>
             </a:r>
           </a:p>
           <a:p>
@@ -13351,7 +13343,7 @@
           </p:nvSpPr>
           <p:spPr>
             <a:xfrm flipV="1">
-              <a:off x="1418782" y="4653874"/>
+              <a:off x="1375652" y="4653874"/>
               <a:ext cx="227589" cy="219656"/>
             </a:xfrm>
             <a:prstGeom prst="ellipse">
@@ -13430,7 +13422,7 @@
           </p:nvSpPr>
           <p:spPr>
             <a:xfrm flipV="1">
-              <a:off x="1859004" y="4653874"/>
+              <a:off x="1764118" y="4653874"/>
               <a:ext cx="227589" cy="219656"/>
             </a:xfrm>
             <a:prstGeom prst="ellipse">
@@ -13512,12 +13504,12 @@
           </p:nvCxnSpPr>
           <p:spPr>
             <a:xfrm rot="10800000">
-              <a:off x="1418782" y="4763702"/>
-              <a:ext cx="829524" cy="289378"/>
+              <a:off x="1375652" y="4763702"/>
+              <a:ext cx="872654" cy="289378"/>
             </a:xfrm>
             <a:prstGeom prst="bentConnector3">
               <a:avLst>
-                <a:gd name="adj1" fmla="val 127558"/>
+                <a:gd name="adj1" fmla="val 121253"/>
               </a:avLst>
             </a:prstGeom>
             <a:ln w="19050">
@@ -13550,8 +13542,8 @@
           </p:nvCxnSpPr>
           <p:spPr>
             <a:xfrm>
-              <a:off x="1646371" y="4763702"/>
-              <a:ext cx="212633" cy="0"/>
+              <a:off x="1603241" y="4763702"/>
+              <a:ext cx="160877" cy="0"/>
             </a:xfrm>
             <a:prstGeom prst="straightConnector1">
               <a:avLst/>
@@ -13629,8 +13621,8 @@
           </p:nvCxnSpPr>
           <p:spPr>
             <a:xfrm flipV="1">
-              <a:off x="2086593" y="4486884"/>
-              <a:ext cx="253045" cy="276818"/>
+              <a:off x="1991707" y="4486884"/>
+              <a:ext cx="347931" cy="276818"/>
             </a:xfrm>
             <a:prstGeom prst="bentConnector2">
               <a:avLst/>
@@ -15255,6 +15247,85 @@
           </p:txBody>
         </p:sp>
       </p:grpSp>
+      <p:sp>
+        <p:nvSpPr>
+          <p:cNvPr id="77" name="Oval 76"/>
+          <p:cNvSpPr/>
+          <p:nvPr/>
+        </p:nvSpPr>
+        <p:spPr>
+          <a:xfrm flipV="1">
+            <a:off x="1998187" y="4937581"/>
+            <a:ext cx="227589" cy="219656"/>
+          </a:xfrm>
+          <a:prstGeom prst="ellipse">
+            <a:avLst/>
+          </a:prstGeom>
+          <a:solidFill>
+            <a:srgbClr val="00B0F0"/>
+          </a:solidFill>
+        </p:spPr>
+        <p:style>
+          <a:lnRef idx="2">
+            <a:schemeClr val="accent1">
+              <a:shade val="50000"/>
+            </a:schemeClr>
+          </a:lnRef>
+          <a:fillRef idx="1">
+            <a:schemeClr val="accent1"/>
+          </a:fillRef>
+          <a:effectRef idx="0">
+            <a:schemeClr val="accent1"/>
+          </a:effectRef>
+          <a:fontRef idx="minor">
+            <a:schemeClr val="lt1"/>
+          </a:fontRef>
+        </p:style>
+        <p:txBody>
+          <a:bodyPr lIns="0" tIns="0" rIns="0" bIns="0" rtlCol="0" anchor="ctr"/>
+          <a:lstStyle/>
+          <a:p>
+            <a:pPr algn="ctr"/>
+            <a:endParaRPr lang="en-US" sz="1200"/>
+          </a:p>
+        </p:txBody>
+      </p:sp>
+      <p:cxnSp>
+        <p:nvCxnSpPr>
+          <p:cNvPr id="78" name="Elbow Connector 77"/>
+          <p:cNvCxnSpPr>
+            <a:stCxn id="33" idx="6"/>
+            <a:endCxn id="77" idx="4"/>
+          </p:cNvCxnSpPr>
+          <p:nvPr/>
+        </p:nvCxnSpPr>
+        <p:spPr>
+          <a:xfrm>
+            <a:off x="1991707" y="4763702"/>
+            <a:ext cx="120275" cy="173879"/>
+          </a:xfrm>
+          <a:prstGeom prst="bentConnector2">
+            <a:avLst/>
+          </a:prstGeom>
+          <a:ln w="19050">
+            <a:tailEnd type="stealth" w="lg" len="lg"/>
+          </a:ln>
+        </p:spPr>
+        <p:style>
+          <a:lnRef idx="1">
+            <a:schemeClr val="accent1"/>
+          </a:lnRef>
+          <a:fillRef idx="0">
+            <a:schemeClr val="accent1"/>
+          </a:fillRef>
+          <a:effectRef idx="0">
+            <a:schemeClr val="accent1"/>
+          </a:effectRef>
+          <a:fontRef idx="minor">
+            <a:schemeClr val="tx1"/>
+          </a:fontRef>
+        </p:style>
+      </p:cxnSp>
     </p:spTree>
     <p:extLst>
       <p:ext uri="{BB962C8B-B14F-4D97-AF65-F5344CB8AC3E}">

</xml_diff>

<commit_message>
Changed name from Master to Release and lower case branch names.
</commit_message>
<xml_diff>
--- a/GIT_ARL_ParaPower_Workflow.pptx
+++ b/GIT_ARL_ParaPower_Workflow.pptx
@@ -247,7 +247,7 @@
             <a:fld id="{BD16C31D-1C22-F84A-A7B5-6952EF1AE403}" type="datetimeFigureOut">
               <a:rPr lang="en-US" altLang="en-US"/>
               <a:pPr/>
-              <a:t>10/24/2019</a:t>
+              <a:t>10/25/2019</a:t>
             </a:fld>
             <a:endParaRPr lang="en-US" altLang="en-US"/>
           </a:p>
@@ -435,7 +435,7 @@
             <a:fld id="{A438D594-1B45-0D47-8F23-AED13F1D19BA}" type="datetimeFigureOut">
               <a:rPr lang="en-US" altLang="en-US"/>
               <a:pPr/>
-              <a:t>10/24/2019</a:t>
+              <a:t>10/25/2019</a:t>
             </a:fld>
             <a:endParaRPr lang="en-US" altLang="en-US"/>
           </a:p>
@@ -11625,13 +11625,13 @@
           <p:nvPr>
             <p:extLst>
               <p:ext uri="{D42A27DB-BD31-4B8C-83A1-F6EECF244321}">
-                <p14:modId xmlns:p14="http://schemas.microsoft.com/office/powerpoint/2010/main" val="3325845288"/>
+                <p14:modId xmlns:p14="http://schemas.microsoft.com/office/powerpoint/2010/main" val="4003197349"/>
               </p:ext>
             </p:extLst>
           </p:nvPr>
         </p:nvGraphicFramePr>
         <p:xfrm>
-          <a:off x="463153" y="800598"/>
+          <a:off x="327856" y="796817"/>
           <a:ext cx="8379390" cy="2852928"/>
         </p:xfrm>
         <a:graphic>
@@ -11641,14 +11641,14 @@
                 <a:tableStyleId>{5C22544A-7EE6-4342-B048-85BDC9FD1C3A}</a:tableStyleId>
               </a:tblPr>
               <a:tblGrid>
-                <a:gridCol w="809085">
+                <a:gridCol w="904677">
                   <a:extLst>
                     <a:ext uri="{9D8B030D-6E8A-4147-A177-3AD203B41FA5}">
                       <a16:colId xmlns:a16="http://schemas.microsoft.com/office/drawing/2014/main" val="484948875"/>
                     </a:ext>
                   </a:extLst>
                 </a:gridCol>
-                <a:gridCol w="2541973">
+                <a:gridCol w="2446381">
                   <a:extLst>
                     <a:ext uri="{9D8B030D-6E8A-4147-A177-3AD203B41FA5}">
                       <a16:colId xmlns:a16="http://schemas.microsoft.com/office/drawing/2014/main" val="2977375988"/>
@@ -11783,7 +11783,7 @@
                     <a:p>
                       <a:r>
                         <a:rPr lang="en-US" sz="1200" dirty="0" smtClean="0"/>
-                        <a:t>Master</a:t>
+                        <a:t>Release</a:t>
                       </a:r>
                       <a:endParaRPr lang="en-US" sz="1200" dirty="0"/>
                     </a:p>
@@ -11871,7 +11871,7 @@
                     <a:p>
                       <a:r>
                         <a:rPr lang="en-US" sz="1200" dirty="0" smtClean="0"/>
-                        <a:t>_Master</a:t>
+                        <a:t>_release</a:t>
                       </a:r>
                       <a:endParaRPr lang="en-US" sz="1200" dirty="0"/>
                     </a:p>
@@ -12002,7 +12002,7 @@
                     <a:p>
                       <a:r>
                         <a:rPr lang="en-US" sz="1200" dirty="0" smtClean="0"/>
-                        <a:t>_Develop</a:t>
+                        <a:t>_develop</a:t>
                       </a:r>
                       <a:endParaRPr lang="en-US" sz="1200" dirty="0"/>
                     </a:p>
@@ -12121,8 +12121,9 @@
                     <a:p>
                       <a:r>
                         <a:rPr lang="en-US" sz="1200" dirty="0" smtClean="0"/>
-                        <a:t>_Internal-</a:t>
+                        <a:t>_internal-</a:t>
                       </a:r>
+                      <a:endParaRPr lang="en-US" sz="1200" dirty="0" smtClean="0"/>
                     </a:p>
                     <a:p>
                       <a:r>
@@ -12297,6 +12298,10 @@
                       <a:r>
                         <a:rPr lang="en-US" sz="1200" dirty="0" smtClean="0"/>
                         <a:t>Release</a:t>
+                      </a:r>
+                      <a:r>
+                        <a:rPr lang="en-US" sz="1200" baseline="0" dirty="0" smtClean="0"/>
+                        <a:t> Candidate</a:t>
                       </a:r>
                       <a:endParaRPr lang="en-US" sz="1200" dirty="0"/>
                     </a:p>
@@ -12755,12 +12760,12 @@
               <a:buChar char="•"/>
             </a:pPr>
             <a:r>
-              <a:rPr lang="en-US" sz="1100" dirty="0" err="1" smtClean="0"/>
-              <a:t>Creaste</a:t>
-            </a:r>
-            <a:r>
               <a:rPr lang="en-US" sz="1100" dirty="0" smtClean="0"/>
-              <a:t> branch </a:t>
+              <a:t>Create </a:t>
+            </a:r>
+            <a:r>
+              <a:rPr lang="en-US" sz="1100" dirty="0" smtClean="0"/>
+              <a:t>branch </a:t>
             </a:r>
             <a:r>
               <a:rPr lang="en-US" sz="1100" dirty="0"/>
@@ -12861,8 +12866,29 @@
             </a:pPr>
             <a:r>
               <a:rPr lang="en-US" sz="1100" dirty="0" smtClean="0"/>
-              <a:t>Merge into Master AND Develop</a:t>
-            </a:r>
+              <a:t>Merge into </a:t>
+            </a:r>
+            <a:r>
+              <a:rPr lang="en-US" sz="1100" dirty="0"/>
+              <a:t>R</a:t>
+            </a:r>
+            <a:r>
+              <a:rPr lang="en-US" sz="1100" dirty="0" smtClean="0"/>
+              <a:t>elease </a:t>
+            </a:r>
+            <a:r>
+              <a:rPr lang="en-US" sz="1100" dirty="0" smtClean="0"/>
+              <a:t>AND </a:t>
+            </a:r>
+            <a:r>
+              <a:rPr lang="en-US" sz="1100" dirty="0"/>
+              <a:t>D</a:t>
+            </a:r>
+            <a:r>
+              <a:rPr lang="en-US" sz="1100" dirty="0" smtClean="0"/>
+              <a:t>evelop</a:t>
+            </a:r>
+            <a:endParaRPr lang="en-US" sz="1100" dirty="0" smtClean="0"/>
           </a:p>
           <a:p>
             <a:r>
@@ -12877,7 +12903,15 @@
             </a:pPr>
             <a:r>
               <a:rPr lang="en-US" sz="1100" dirty="0" smtClean="0"/>
-              <a:t>Create branch off of Master, Name is Hotfix-NNN</a:t>
+              <a:t>Create branch off of </a:t>
+            </a:r>
+            <a:r>
+              <a:rPr lang="en-US" sz="1100" dirty="0" smtClean="0"/>
+              <a:t>Release, </a:t>
+            </a:r>
+            <a:r>
+              <a:rPr lang="en-US" sz="1100" dirty="0" smtClean="0"/>
+              <a:t>Name is Hotfix-NNN</a:t>
             </a:r>
           </a:p>
           <a:p>
@@ -12897,7 +12931,19 @@
             </a:pPr>
             <a:r>
               <a:rPr lang="en-US" sz="1100" dirty="0" smtClean="0"/>
-              <a:t>Merge into Master AND Develop</a:t>
+              <a:t>Merge </a:t>
+            </a:r>
+            <a:r>
+              <a:rPr lang="en-US" sz="1100" smtClean="0"/>
+              <a:t>into </a:t>
+            </a:r>
+            <a:r>
+              <a:rPr lang="en-US" sz="1100" smtClean="0"/>
+              <a:t>Release </a:t>
+            </a:r>
+            <a:r>
+              <a:rPr lang="en-US" sz="1100" dirty="0" smtClean="0"/>
+              <a:t>AND Develop</a:t>
             </a:r>
           </a:p>
           <a:p>
@@ -13074,7 +13120,7 @@
         <p:spPr>
           <a:xfrm>
             <a:off x="179451" y="4183473"/>
-            <a:ext cx="554639" cy="184666"/>
+            <a:ext cx="586699" cy="184666"/>
           </a:xfrm>
           <a:prstGeom prst="rect">
             <a:avLst/>
@@ -13094,7 +13140,7 @@
           <a:p>
             <a:r>
               <a:rPr lang="en-US" sz="1200" dirty="0" smtClean="0"/>
-              <a:t>_Master</a:t>
+              <a:t>_release</a:t>
             </a:r>
             <a:endParaRPr lang="en-US" sz="1200" dirty="0"/>
           </a:p>
@@ -13141,7 +13187,7 @@
         <p:spPr>
           <a:xfrm>
             <a:off x="125831" y="4858427"/>
-            <a:ext cx="646011" cy="184666"/>
+            <a:ext cx="620363" cy="184666"/>
           </a:xfrm>
           <a:prstGeom prst="rect">
             <a:avLst/>
@@ -13158,7 +13204,7 @@
           <a:p>
             <a:r>
               <a:rPr lang="en-US" sz="1200" dirty="0" smtClean="0"/>
-              <a:t>_Develop</a:t>
+              <a:t>_develop</a:t>
             </a:r>
             <a:endParaRPr lang="en-US" sz="1200" dirty="0"/>
           </a:p>
@@ -13301,7 +13347,7 @@
         <p:spPr>
           <a:xfrm>
             <a:off x="105818" y="5776767"/>
-            <a:ext cx="596317" cy="369332"/>
+            <a:ext cx="586699" cy="369332"/>
           </a:xfrm>
           <a:prstGeom prst="rect">
             <a:avLst/>
@@ -13318,7 +13364,19 @@
           <a:p>
             <a:r>
               <a:rPr lang="en-US" sz="1200" dirty="0" smtClean="0"/>
-              <a:t>_Internal</a:t>
+              <a:t>_</a:t>
+            </a:r>
+            <a:r>
+              <a:rPr lang="en-US" sz="1200" dirty="0"/>
+              <a:t>i</a:t>
+            </a:r>
+            <a:r>
+              <a:rPr lang="en-US" sz="1200" dirty="0" smtClean="0"/>
+              <a:t>nternal</a:t>
+            </a:r>
+            <a:r>
+              <a:rPr lang="en-US" sz="1200" dirty="0" smtClean="0"/>
+              <a:t/>
             </a:r>
             <a:br>
               <a:rPr lang="en-US" sz="1200" dirty="0" smtClean="0"/>
@@ -17290,26 +17348,12 @@
 </file>
 
 <file path=customXml/item1.xml><?xml version="1.0" encoding="utf-8"?>
-<p:properties xmlns:p="http://schemas.microsoft.com/office/2006/metadata/properties" xmlns:xsi="http://www.w3.org/2001/XMLSchema-instance" xmlns:pc="http://schemas.microsoft.com/office/infopath/2007/PartnerControls">
-  <documentManagement>
-    <AlternateThumbnailUrl xmlns="http://schemas.microsoft.com/sharepoint/v3">
-      <Url xsi:nil="true"/>
-      <Description xsi:nil="true"/>
-    </AlternateThumbnailUrl>
-    <Group xmlns="8acc76ce-4927-4c10-947a-54b615abcc3a">PowerPoint</Group>
-    <Display_x0020_Name xmlns="8acc76ce-4927-4c10-947a-54b615abcc3a">CCDC Army Research Laboratory – PowerPoint (Briefing) – Standard Format</Display_x0020_Name>
-    <ImageCreateDate xmlns="http://schemas.microsoft.com/sharepoint/v3" xsi:nil="true"/>
-    <Organization xmlns="2c061caa-ac96-4ed1-b74a-abb1169dd94c">ARL</Organization>
-    <Description xmlns="http://schemas.microsoft.com/sharepoint/v3" xsi:nil="true"/>
-    <Desktop xmlns="8acc76ce-4927-4c10-947a-54b615abcc3a">Both</Desktop>
-    <DL_Link xmlns="8acc76ce-4927-4c10-947a-54b615abcc3a">
-      <Url>https://rdecom.apgea.army.mil/_layouts/download.aspx?SourceUrl=https://rdecom.apgea.army.mil/BP/BrandItems/PowerPoint_Template_RLB.pptx</Url>
-      <Description>DOWNLOAD</Description>
-    </DL_Link>
-    <FileType0 xmlns="8acc76ce-4927-4c10-947a-54b615abcc3a">pptx</FileType0>
-    <SortOrder xmlns="8acc76ce-4927-4c10-947a-54b615abcc3a">04 – PowerPoint (Briefing) Templates</SortOrder>
-  </documentManagement>
-</p:properties>
+<?mso-contentType ?>
+<FormTemplates xmlns="http://schemas.microsoft.com/sharepoint/v3/contenttype/forms">
+  <Display>DocumentLibraryForm</Display>
+  <Edit>DocumentLibraryForm</Edit>
+  <New>DocumentLibraryForm</New>
+</FormTemplates>
 </file>
 
 <file path=customXml/item2.xml><?xml version="1.0" encoding="utf-8"?>
@@ -17615,28 +17659,32 @@
 </file>
 
 <file path=customXml/item3.xml><?xml version="1.0" encoding="utf-8"?>
-<?mso-contentType ?>
-<FormTemplates xmlns="http://schemas.microsoft.com/sharepoint/v3/contenttype/forms">
-  <Display>DocumentLibraryForm</Display>
-  <Edit>DocumentLibraryForm</Edit>
-  <New>DocumentLibraryForm</New>
-</FormTemplates>
+<p:properties xmlns:p="http://schemas.microsoft.com/office/2006/metadata/properties" xmlns:xsi="http://www.w3.org/2001/XMLSchema-instance" xmlns:pc="http://schemas.microsoft.com/office/infopath/2007/PartnerControls">
+  <documentManagement>
+    <AlternateThumbnailUrl xmlns="http://schemas.microsoft.com/sharepoint/v3">
+      <Url xsi:nil="true"/>
+      <Description xsi:nil="true"/>
+    </AlternateThumbnailUrl>
+    <Group xmlns="8acc76ce-4927-4c10-947a-54b615abcc3a">PowerPoint</Group>
+    <Display_x0020_Name xmlns="8acc76ce-4927-4c10-947a-54b615abcc3a">CCDC Army Research Laboratory – PowerPoint (Briefing) – Standard Format</Display_x0020_Name>
+    <ImageCreateDate xmlns="http://schemas.microsoft.com/sharepoint/v3" xsi:nil="true"/>
+    <Organization xmlns="2c061caa-ac96-4ed1-b74a-abb1169dd94c">ARL</Organization>
+    <Description xmlns="http://schemas.microsoft.com/sharepoint/v3" xsi:nil="true"/>
+    <Desktop xmlns="8acc76ce-4927-4c10-947a-54b615abcc3a">Both</Desktop>
+    <DL_Link xmlns="8acc76ce-4927-4c10-947a-54b615abcc3a">
+      <Url>https://rdecom.apgea.army.mil/_layouts/download.aspx?SourceUrl=https://rdecom.apgea.army.mil/BP/BrandItems/PowerPoint_Template_RLB.pptx</Url>
+      <Description>DOWNLOAD</Description>
+    </DL_Link>
+    <FileType0 xmlns="8acc76ce-4927-4c10-947a-54b615abcc3a">pptx</FileType0>
+    <SortOrder xmlns="8acc76ce-4927-4c10-947a-54b615abcc3a">04 – PowerPoint (Briefing) Templates</SortOrder>
+  </documentManagement>
+</p:properties>
 </file>
 
 <file path=customXml/itemProps1.xml><?xml version="1.0" encoding="utf-8"?>
-<ds:datastoreItem xmlns:ds="http://schemas.openxmlformats.org/officeDocument/2006/customXml" ds:itemID="{18FEFD74-9FBC-4157-8802-AFD8EC757C9F}">
+<ds:datastoreItem xmlns:ds="http://schemas.openxmlformats.org/officeDocument/2006/customXml" ds:itemID="{613FA5FF-2111-4E01-9BF6-3626FF06C57A}">
   <ds:schemaRefs>
-    <ds:schemaRef ds:uri="http://schemas.openxmlformats.org/package/2006/metadata/core-properties"/>
-    <ds:schemaRef ds:uri="http://schemas.microsoft.com/office/2006/documentManagement/types"/>
-    <ds:schemaRef ds:uri="http://schemas.microsoft.com/office/infopath/2007/PartnerControls"/>
-    <ds:schemaRef ds:uri="http://purl.org/dc/elements/1.1/"/>
-    <ds:schemaRef ds:uri="8acc76ce-4927-4c10-947a-54b615abcc3a"/>
-    <ds:schemaRef ds:uri="http://schemas.microsoft.com/office/2006/metadata/properties"/>
-    <ds:schemaRef ds:uri="http://schemas.microsoft.com/sharepoint/v3"/>
-    <ds:schemaRef ds:uri="http://purl.org/dc/terms/"/>
-    <ds:schemaRef ds:uri="2c061caa-ac96-4ed1-b74a-abb1169dd94c"/>
-    <ds:schemaRef ds:uri="http://www.w3.org/XML/1998/namespace"/>
-    <ds:schemaRef ds:uri="http://purl.org/dc/dcmitype/"/>
+    <ds:schemaRef ds:uri="http://schemas.microsoft.com/sharepoint/v3/contenttype/forms"/>
   </ds:schemaRefs>
 </ds:datastoreItem>
 </file>
@@ -17662,9 +17710,19 @@
 </file>
 
 <file path=customXml/itemProps3.xml><?xml version="1.0" encoding="utf-8"?>
-<ds:datastoreItem xmlns:ds="http://schemas.openxmlformats.org/officeDocument/2006/customXml" ds:itemID="{613FA5FF-2111-4E01-9BF6-3626FF06C57A}">
+<ds:datastoreItem xmlns:ds="http://schemas.openxmlformats.org/officeDocument/2006/customXml" ds:itemID="{18FEFD74-9FBC-4157-8802-AFD8EC757C9F}">
   <ds:schemaRefs>
-    <ds:schemaRef ds:uri="http://schemas.microsoft.com/sharepoint/v3/contenttype/forms"/>
+    <ds:schemaRef ds:uri="http://schemas.openxmlformats.org/package/2006/metadata/core-properties"/>
+    <ds:schemaRef ds:uri="http://schemas.microsoft.com/office/2006/documentManagement/types"/>
+    <ds:schemaRef ds:uri="http://schemas.microsoft.com/office/infopath/2007/PartnerControls"/>
+    <ds:schemaRef ds:uri="http://purl.org/dc/elements/1.1/"/>
+    <ds:schemaRef ds:uri="8acc76ce-4927-4c10-947a-54b615abcc3a"/>
+    <ds:schemaRef ds:uri="http://schemas.microsoft.com/office/2006/metadata/properties"/>
+    <ds:schemaRef ds:uri="http://schemas.microsoft.com/sharepoint/v3"/>
+    <ds:schemaRef ds:uri="http://purl.org/dc/terms/"/>
+    <ds:schemaRef ds:uri="2c061caa-ac96-4ed1-b74a-abb1169dd94c"/>
+    <ds:schemaRef ds:uri="http://www.w3.org/XML/1998/namespace"/>
+    <ds:schemaRef ds:uri="http://purl.org/dc/dcmitype/"/>
   </ds:schemaRefs>
 </ds:datastoreItem>
 </file>
</xml_diff>

<commit_message>
Added hotfix name change to ppt
</commit_message>
<xml_diff>
--- a/GIT_ARL_ParaPower_Workflow.pptx
+++ b/GIT_ARL_ParaPower_Workflow.pptx
@@ -247,7 +247,7 @@
             <a:fld id="{BD16C31D-1C22-F84A-A7B5-6952EF1AE403}" type="datetimeFigureOut">
               <a:rPr lang="en-US" altLang="en-US"/>
               <a:pPr/>
-              <a:t>10/25/2019</a:t>
+              <a:t>11/1/2019</a:t>
             </a:fld>
             <a:endParaRPr lang="en-US" altLang="en-US"/>
           </a:p>
@@ -435,7 +435,7 @@
             <a:fld id="{A438D594-1B45-0D47-8F23-AED13F1D19BA}" type="datetimeFigureOut">
               <a:rPr lang="en-US" altLang="en-US"/>
               <a:pPr/>
-              <a:t>10/25/2019</a:t>
+              <a:t>11/1/2019</a:t>
             </a:fld>
             <a:endParaRPr lang="en-US" altLang="en-US"/>
           </a:p>
@@ -11593,7 +11593,7 @@
           <p:nvPr>
             <p:extLst>
               <p:ext uri="{D42A27DB-BD31-4B8C-83A1-F6EECF244321}">
-                <p14:modId xmlns:p14="http://schemas.microsoft.com/office/powerpoint/2010/main" val="639996386"/>
+                <p14:modId xmlns:p14="http://schemas.microsoft.com/office/powerpoint/2010/main" val="3644305150"/>
               </p:ext>
             </p:extLst>
           </p:nvPr>
@@ -12198,10 +12198,6 @@
                         <a:rPr lang="en-US" sz="1200" dirty="0" smtClean="0"/>
                         <a:t>Release</a:t>
                       </a:r>
-                      <a:r>
-                        <a:rPr lang="en-US" sz="1200" dirty="0" smtClean="0"/>
-                        <a:t/>
-                      </a:r>
                       <a:br>
                         <a:rPr lang="en-US" sz="1200" dirty="0" smtClean="0"/>
                       </a:br>
@@ -12225,7 +12221,7 @@
                     <a:p>
                       <a:r>
                         <a:rPr lang="en-US" sz="1200" dirty="0" smtClean="0"/>
-                        <a:t>Hotfix-XXX</a:t>
+                        <a:t>Hotfix-YYMMDD</a:t>
                       </a:r>
                       <a:endParaRPr lang="en-US" sz="1200" dirty="0"/>
                     </a:p>
@@ -12331,10 +12327,6 @@
                       <a:r>
                         <a:rPr lang="en-US" sz="1200" dirty="0" smtClean="0"/>
                         <a:t>Release</a:t>
-                      </a:r>
-                      <a:r>
-                        <a:rPr lang="en-US" sz="1200" dirty="0" smtClean="0"/>
-                        <a:t/>
                       </a:r>
                       <a:br>
                         <a:rPr lang="en-US" sz="1200" dirty="0" smtClean="0"/>
@@ -12465,7 +12457,6 @@
                         <a:rPr lang="en-US" sz="1200" dirty="0" smtClean="0"/>
                         <a:t>Develop</a:t>
                       </a:r>
-                      <a:endParaRPr lang="en-US" sz="1200" dirty="0" smtClean="0"/>
                     </a:p>
                   </a:txBody>
                   <a:tcPr marT="18288" marB="18288" anchor="ctr">
@@ -12617,11 +12608,7 @@
                     <a:p>
                       <a:r>
                         <a:rPr lang="en-US" sz="1200" dirty="0" smtClean="0"/>
-                        <a:t>I</a:t>
-                      </a:r>
-                      <a:r>
-                        <a:rPr lang="en-US" sz="1200" dirty="0" smtClean="0"/>
-                        <a:t>_###_ZZZ</a:t>
+                        <a:t>I_###_ZZZ</a:t>
                       </a:r>
                       <a:endParaRPr lang="en-US" sz="1200" dirty="0"/>
                     </a:p>
@@ -12694,11 +12681,7 @@
             </a:r>
             <a:r>
               <a:rPr lang="en-US" sz="1100" dirty="0" err="1" smtClean="0"/>
-              <a:t>P</a:t>
-            </a:r>
-            <a:r>
-              <a:rPr lang="en-US" sz="1100" dirty="0" err="1" smtClean="0"/>
-              <a:t>_#_anything</a:t>
+              <a:t>P_#_anything</a:t>
             </a:r>
             <a:endParaRPr lang="en-US" sz="1100" dirty="0" smtClean="0"/>
           </a:p>
@@ -12719,13 +12702,8 @@
             </a:pPr>
             <a:r>
               <a:rPr lang="en-US" sz="1100" dirty="0" smtClean="0"/>
-              <a:t>Merge Develop into </a:t>
-            </a:r>
-            <a:r>
-              <a:rPr lang="en-US" sz="1100" dirty="0" smtClean="0"/>
-              <a:t>Private</a:t>
-            </a:r>
-            <a:endParaRPr lang="en-US" sz="1100" dirty="0" smtClean="0"/>
+              <a:t>Merge Develop into Private</a:t>
+            </a:r>
           </a:p>
           <a:p>
             <a:r>
@@ -12748,11 +12726,7 @@
             </a:r>
             <a:r>
               <a:rPr lang="en-US" sz="1100" dirty="0" smtClean="0"/>
-              <a:t>Private, </a:t>
-            </a:r>
-            <a:r>
-              <a:rPr lang="en-US" sz="1100" dirty="0" smtClean="0"/>
-              <a:t>Name </a:t>
+              <a:t>Private, Name </a:t>
             </a:r>
             <a:r>
               <a:rPr lang="en-US" sz="1100" dirty="0"/>
@@ -12760,11 +12734,7 @@
             </a:r>
             <a:r>
               <a:rPr lang="en-US" sz="1100" dirty="0" err="1" smtClean="0"/>
-              <a:t>I</a:t>
-            </a:r>
-            <a:r>
-              <a:rPr lang="en-US" sz="1100" dirty="0" err="1" smtClean="0"/>
-              <a:t>_#_anything</a:t>
+              <a:t>I_#_anything</a:t>
             </a:r>
             <a:endParaRPr lang="en-US" sz="1100" dirty="0"/>
           </a:p>
@@ -12785,7 +12755,6 @@
               <a:rPr lang="en-US" sz="1100" dirty="0" smtClean="0"/>
               <a:t>Private</a:t>
             </a:r>
-            <a:endParaRPr lang="en-US" sz="1100" dirty="0" smtClean="0"/>
           </a:p>
           <a:p>
             <a:pPr marL="171450" indent="-171450">
@@ -12794,13 +12763,8 @@
             </a:pPr>
             <a:r>
               <a:rPr lang="en-US" sz="1100" dirty="0" smtClean="0"/>
-              <a:t>To release feature, merge feature </a:t>
-            </a:r>
-            <a:r>
-              <a:rPr lang="en-US" sz="1100" dirty="0" smtClean="0"/>
-              <a:t>to intermediate feature from Develop</a:t>
-            </a:r>
-            <a:endParaRPr lang="en-US" sz="1100" dirty="0" smtClean="0"/>
+              <a:t>To release feature, merge feature to intermediate feature from Develop</a:t>
+            </a:r>
           </a:p>
           <a:p>
             <a:r>
@@ -15366,8 +15330,8 @@
         </p:nvSpPr>
         <p:spPr>
           <a:xfrm>
-            <a:off x="2239652" y="4171149"/>
-            <a:ext cx="628057" cy="153888"/>
+            <a:off x="2093008" y="4171149"/>
+            <a:ext cx="839653" cy="153888"/>
           </a:xfrm>
           <a:prstGeom prst="rect">
             <a:avLst/>
@@ -15384,7 +15348,7 @@
           <a:p>
             <a:r>
               <a:rPr lang="en-US" sz="1000" dirty="0" smtClean="0"/>
-              <a:t>Hotfix-012</a:t>
+              <a:t>Hotfix-191026</a:t>
             </a:r>
             <a:endParaRPr lang="en-US" sz="1000" dirty="0"/>
           </a:p>
@@ -17613,26 +17577,12 @@
 </file>
 
 <file path=customXml/item1.xml><?xml version="1.0" encoding="utf-8"?>
-<p:properties xmlns:p="http://schemas.microsoft.com/office/2006/metadata/properties" xmlns:xsi="http://www.w3.org/2001/XMLSchema-instance" xmlns:pc="http://schemas.microsoft.com/office/infopath/2007/PartnerControls">
-  <documentManagement>
-    <AlternateThumbnailUrl xmlns="http://schemas.microsoft.com/sharepoint/v3">
-      <Url xsi:nil="true"/>
-      <Description xsi:nil="true"/>
-    </AlternateThumbnailUrl>
-    <Group xmlns="8acc76ce-4927-4c10-947a-54b615abcc3a">PowerPoint</Group>
-    <Display_x0020_Name xmlns="8acc76ce-4927-4c10-947a-54b615abcc3a">CCDC Army Research Laboratory – PowerPoint (Briefing) – Standard Format</Display_x0020_Name>
-    <ImageCreateDate xmlns="http://schemas.microsoft.com/sharepoint/v3" xsi:nil="true"/>
-    <Organization xmlns="2c061caa-ac96-4ed1-b74a-abb1169dd94c">ARL</Organization>
-    <Description xmlns="http://schemas.microsoft.com/sharepoint/v3" xsi:nil="true"/>
-    <Desktop xmlns="8acc76ce-4927-4c10-947a-54b615abcc3a">Both</Desktop>
-    <DL_Link xmlns="8acc76ce-4927-4c10-947a-54b615abcc3a">
-      <Url>https://rdecom.apgea.army.mil/_layouts/download.aspx?SourceUrl=https://rdecom.apgea.army.mil/BP/BrandItems/PowerPoint_Template_RLB.pptx</Url>
-      <Description>DOWNLOAD</Description>
-    </DL_Link>
-    <FileType0 xmlns="8acc76ce-4927-4c10-947a-54b615abcc3a">pptx</FileType0>
-    <SortOrder xmlns="8acc76ce-4927-4c10-947a-54b615abcc3a">04 – PowerPoint (Briefing) Templates</SortOrder>
-  </documentManagement>
-</p:properties>
+<?mso-contentType ?>
+<FormTemplates xmlns="http://schemas.microsoft.com/sharepoint/v3/contenttype/forms">
+  <Display>DocumentLibraryForm</Display>
+  <Edit>DocumentLibraryForm</Edit>
+  <New>DocumentLibraryForm</New>
+</FormTemplates>
 </file>
 
 <file path=customXml/item2.xml><?xml version="1.0" encoding="utf-8"?>
@@ -17938,28 +17888,32 @@
 </file>
 
 <file path=customXml/item3.xml><?xml version="1.0" encoding="utf-8"?>
-<?mso-contentType ?>
-<FormTemplates xmlns="http://schemas.microsoft.com/sharepoint/v3/contenttype/forms">
-  <Display>DocumentLibraryForm</Display>
-  <Edit>DocumentLibraryForm</Edit>
-  <New>DocumentLibraryForm</New>
-</FormTemplates>
+<p:properties xmlns:p="http://schemas.microsoft.com/office/2006/metadata/properties" xmlns:xsi="http://www.w3.org/2001/XMLSchema-instance" xmlns:pc="http://schemas.microsoft.com/office/infopath/2007/PartnerControls">
+  <documentManagement>
+    <AlternateThumbnailUrl xmlns="http://schemas.microsoft.com/sharepoint/v3">
+      <Url xsi:nil="true"/>
+      <Description xsi:nil="true"/>
+    </AlternateThumbnailUrl>
+    <Group xmlns="8acc76ce-4927-4c10-947a-54b615abcc3a">PowerPoint</Group>
+    <Display_x0020_Name xmlns="8acc76ce-4927-4c10-947a-54b615abcc3a">CCDC Army Research Laboratory – PowerPoint (Briefing) – Standard Format</Display_x0020_Name>
+    <ImageCreateDate xmlns="http://schemas.microsoft.com/sharepoint/v3" xsi:nil="true"/>
+    <Organization xmlns="2c061caa-ac96-4ed1-b74a-abb1169dd94c">ARL</Organization>
+    <Description xmlns="http://schemas.microsoft.com/sharepoint/v3" xsi:nil="true"/>
+    <Desktop xmlns="8acc76ce-4927-4c10-947a-54b615abcc3a">Both</Desktop>
+    <DL_Link xmlns="8acc76ce-4927-4c10-947a-54b615abcc3a">
+      <Url>https://rdecom.apgea.army.mil/_layouts/download.aspx?SourceUrl=https://rdecom.apgea.army.mil/BP/BrandItems/PowerPoint_Template_RLB.pptx</Url>
+      <Description>DOWNLOAD</Description>
+    </DL_Link>
+    <FileType0 xmlns="8acc76ce-4927-4c10-947a-54b615abcc3a">pptx</FileType0>
+    <SortOrder xmlns="8acc76ce-4927-4c10-947a-54b615abcc3a">04 – PowerPoint (Briefing) Templates</SortOrder>
+  </documentManagement>
+</p:properties>
 </file>
 
 <file path=customXml/itemProps1.xml><?xml version="1.0" encoding="utf-8"?>
-<ds:datastoreItem xmlns:ds="http://schemas.openxmlformats.org/officeDocument/2006/customXml" ds:itemID="{18FEFD74-9FBC-4157-8802-AFD8EC757C9F}">
+<ds:datastoreItem xmlns:ds="http://schemas.openxmlformats.org/officeDocument/2006/customXml" ds:itemID="{613FA5FF-2111-4E01-9BF6-3626FF06C57A}">
   <ds:schemaRefs>
-    <ds:schemaRef ds:uri="http://schemas.microsoft.com/sharepoint/v3"/>
-    <ds:schemaRef ds:uri="http://schemas.openxmlformats.org/package/2006/metadata/core-properties"/>
-    <ds:schemaRef ds:uri="http://purl.org/dc/terms/"/>
-    <ds:schemaRef ds:uri="http://schemas.microsoft.com/office/infopath/2007/PartnerControls"/>
-    <ds:schemaRef ds:uri="http://schemas.microsoft.com/office/2006/documentManagement/types"/>
-    <ds:schemaRef ds:uri="8acc76ce-4927-4c10-947a-54b615abcc3a"/>
-    <ds:schemaRef ds:uri="http://schemas.microsoft.com/office/2006/metadata/properties"/>
-    <ds:schemaRef ds:uri="http://purl.org/dc/elements/1.1/"/>
-    <ds:schemaRef ds:uri="2c061caa-ac96-4ed1-b74a-abb1169dd94c"/>
-    <ds:schemaRef ds:uri="http://www.w3.org/XML/1998/namespace"/>
-    <ds:schemaRef ds:uri="http://purl.org/dc/dcmitype/"/>
+    <ds:schemaRef ds:uri="http://schemas.microsoft.com/sharepoint/v3/contenttype/forms"/>
   </ds:schemaRefs>
 </ds:datastoreItem>
 </file>
@@ -17985,9 +17939,19 @@
 </file>
 
 <file path=customXml/itemProps3.xml><?xml version="1.0" encoding="utf-8"?>
-<ds:datastoreItem xmlns:ds="http://schemas.openxmlformats.org/officeDocument/2006/customXml" ds:itemID="{613FA5FF-2111-4E01-9BF6-3626FF06C57A}">
+<ds:datastoreItem xmlns:ds="http://schemas.openxmlformats.org/officeDocument/2006/customXml" ds:itemID="{18FEFD74-9FBC-4157-8802-AFD8EC757C9F}">
   <ds:schemaRefs>
-    <ds:schemaRef ds:uri="http://schemas.microsoft.com/sharepoint/v3/contenttype/forms"/>
+    <ds:schemaRef ds:uri="http://schemas.microsoft.com/office/2006/documentManagement/types"/>
+    <ds:schemaRef ds:uri="http://schemas.microsoft.com/sharepoint/v3"/>
+    <ds:schemaRef ds:uri="http://purl.org/dc/elements/1.1/"/>
+    <ds:schemaRef ds:uri="http://schemas.openxmlformats.org/package/2006/metadata/core-properties"/>
+    <ds:schemaRef ds:uri="2c061caa-ac96-4ed1-b74a-abb1169dd94c"/>
+    <ds:schemaRef ds:uri="http://schemas.microsoft.com/office/infopath/2007/PartnerControls"/>
+    <ds:schemaRef ds:uri="http://purl.org/dc/terms/"/>
+    <ds:schemaRef ds:uri="8acc76ce-4927-4c10-947a-54b615abcc3a"/>
+    <ds:schemaRef ds:uri="http://schemas.microsoft.com/office/2006/metadata/properties"/>
+    <ds:schemaRef ds:uri="http://www.w3.org/XML/1998/namespace"/>
+    <ds:schemaRef ds:uri="http://purl.org/dc/dcmitype/"/>
   </ds:schemaRefs>
 </ds:datastoreItem>
 </file>
</xml_diff>